<commit_message>
"Update of GUI ppt File"
</commit_message>
<xml_diff>
--- a/Documentation Files/GUI System.pptx
+++ b/Documentation Files/GUI System.pptx
@@ -5,7 +5,7 @@
     <p:sldMasterId id="2147483648" r:id="rId1"/>
   </p:sldMasterIdLst>
   <p:notesMasterIdLst>
-    <p:notesMasterId r:id="rId16"/>
+    <p:notesMasterId r:id="rId18"/>
   </p:notesMasterIdLst>
   <p:sldIdLst>
     <p:sldId id="256" r:id="rId2"/>
@@ -22,6 +22,8 @@
     <p:sldId id="261" r:id="rId13"/>
     <p:sldId id="262" r:id="rId14"/>
     <p:sldId id="263" r:id="rId15"/>
+    <p:sldId id="271" r:id="rId16"/>
+    <p:sldId id="272" r:id="rId17"/>
   </p:sldIdLst>
   <p:sldSz cx="12192000" cy="6858000"/>
   <p:notesSz cx="6858000" cy="9144000"/>
@@ -255,8 +257,11 @@
     </a:lvl9pPr>
   </p:defaultTextStyle>
   <p:extLst>
+    <p:ext uri="{EFAFB233-063F-42B5-8137-9DF3F51BA10A}">
+      <p15:sldGuideLst xmlns:p15="http://schemas.microsoft.com/office/powerpoint/2012/main"/>
+    </p:ext>
     <p:ext uri="http://customooxmlschemas.google.com/">
-      <go:slidesCustomData xmlns:go="http://customooxmlschemas.google.com/" xmlns:ahyp="http://schemas.microsoft.com/office/drawing/2018/hyperlinkcolor" xmlns:p15="http://schemas.microsoft.com/office/powerpoint/2012/main" xmlns:p14="http://schemas.microsoft.com/office/powerpoint/2010/main" xmlns:com="http://schemas.openxmlformats.org/drawingml/2006/compatibility" xmlns:pvml="urn:schemas-microsoft-com:office:powerpoint" xmlns:v="urn:schemas-microsoft-com:vml" xmlns:o="urn:schemas-microsoft-com:office:office" xmlns:dgm="http://schemas.openxmlformats.org/drawingml/2006/diagram" xmlns:c="http://schemas.openxmlformats.org/drawingml/2006/chart" xmlns:mv="urn:schemas-microsoft-com:mac:vml" xmlns:mc="http://schemas.openxmlformats.org/markup-compatibility/2006" xmlns="" r:id="rId17" roundtripDataSignature="AMtx7mjKWeo43A/vKYv/cCweX4rmN1lmsg=="/>
+      <go:slidesCustomData xmlns:go="http://customooxmlschemas.google.com/" xmlns:ahyp="http://schemas.microsoft.com/office/drawing/2018/hyperlinkcolor" xmlns:p15="http://schemas.microsoft.com/office/powerpoint/2012/main" xmlns:p14="http://schemas.microsoft.com/office/powerpoint/2010/main" xmlns:com="http://schemas.openxmlformats.org/drawingml/2006/compatibility" xmlns:pvml="urn:schemas-microsoft-com:office:powerpoint" xmlns:v="urn:schemas-microsoft-com:vml" xmlns:o="urn:schemas-microsoft-com:office:office" xmlns:dgm="http://schemas.openxmlformats.org/drawingml/2006/diagram" xmlns:c="http://schemas.openxmlformats.org/drawingml/2006/chart" xmlns:mv="urn:schemas-microsoft-com:mac:vml" xmlns:mc="http://schemas.openxmlformats.org/markup-compatibility/2006" xmlns="" r:id="rId19" roundtripDataSignature="AMtx7mjKWeo43A/vKYv/cCweX4rmN1lmsg=="/>
     </p:ext>
   </p:extLst>
 </p:presentation>
@@ -874,8 +879,8 @@
         </p:nvSpPr>
         <p:spPr>
           <a:xfrm>
-            <a:off x="1143225" y="685800"/>
-            <a:ext cx="4572225" cy="3429000"/>
+            <a:off x="381000" y="685800"/>
+            <a:ext cx="6096000" cy="3429000"/>
           </a:xfrm>
           <a:custGeom>
             <a:avLst/>
@@ -978,8 +983,8 @@
         </p:nvSpPr>
         <p:spPr>
           <a:xfrm>
-            <a:off x="1143225" y="685800"/>
-            <a:ext cx="4572225" cy="3429000"/>
+            <a:off x="381000" y="685800"/>
+            <a:ext cx="6096000" cy="3429000"/>
           </a:xfrm>
           <a:custGeom>
             <a:avLst/>
@@ -1320,6 +1325,72 @@
         </p:spPr>
       </p:sp>
     </p:spTree>
+  </p:cSld>
+  <p:clrMapOvr>
+    <a:masterClrMapping/>
+  </p:clrMapOvr>
+</p:notes>
+</file>
+
+<file path=ppt/notesSlides/notesSlide15.xml><?xml version="1.0" encoding="utf-8"?>
+<p:notes xmlns:a="http://schemas.openxmlformats.org/drawingml/2006/main" xmlns:r="http://schemas.openxmlformats.org/officeDocument/2006/relationships" xmlns:p="http://schemas.openxmlformats.org/presentationml/2006/main">
+  <p:cSld>
+    <p:spTree>
+      <p:nvGrpSpPr>
+        <p:cNvPr id="1" name=""/>
+        <p:cNvGrpSpPr/>
+        <p:nvPr/>
+      </p:nvGrpSpPr>
+      <p:grpSpPr>
+        <a:xfrm>
+          <a:off x="0" y="0"/>
+          <a:ext cx="0" cy="0"/>
+          <a:chOff x="0" y="0"/>
+          <a:chExt cx="0" cy="0"/>
+        </a:xfrm>
+      </p:grpSpPr>
+      <p:sp>
+        <p:nvSpPr>
+          <p:cNvPr id="2" name="Slide Image Placeholder 1"/>
+          <p:cNvSpPr>
+            <a:spLocks noGrp="1" noRot="1" noChangeAspect="1"/>
+          </p:cNvSpPr>
+          <p:nvPr>
+            <p:ph type="sldImg"/>
+          </p:nvPr>
+        </p:nvSpPr>
+        <p:spPr>
+          <a:xfrm>
+            <a:off x="381000" y="685800"/>
+            <a:ext cx="6096000" cy="3429000"/>
+          </a:xfrm>
+        </p:spPr>
+      </p:sp>
+      <p:sp>
+        <p:nvSpPr>
+          <p:cNvPr id="3" name="Notes Placeholder 2"/>
+          <p:cNvSpPr>
+            <a:spLocks noGrp="1"/>
+          </p:cNvSpPr>
+          <p:nvPr>
+            <p:ph type="body" idx="1"/>
+          </p:nvPr>
+        </p:nvSpPr>
+        <p:spPr/>
+        <p:txBody>
+          <a:bodyPr/>
+          <a:lstStyle/>
+          <a:p>
+            <a:endParaRPr lang="es-AR" dirty="0"/>
+          </a:p>
+        </p:txBody>
+      </p:sp>
+    </p:spTree>
+    <p:extLst>
+      <p:ext uri="{BB962C8B-B14F-4D97-AF65-F5344CB8AC3E}">
+        <p14:creationId xmlns:p14="http://schemas.microsoft.com/office/powerpoint/2010/main" val="2196933066"/>
+      </p:ext>
+    </p:extLst>
   </p:cSld>
   <p:clrMapOvr>
     <a:masterClrMapping/>
@@ -2152,8 +2223,8 @@
         </p:nvSpPr>
         <p:spPr>
           <a:xfrm>
-            <a:off x="1143225" y="685800"/>
-            <a:ext cx="4572225" cy="3429000"/>
+            <a:off x="381000" y="685800"/>
+            <a:ext cx="6096000" cy="3429000"/>
           </a:xfrm>
           <a:custGeom>
             <a:avLst/>
@@ -11701,56 +11772,6 @@
               <a:rPr lang="en-US"/>
               <a:t>‹#›</a:t>
             </a:fld>
-            <a:endParaRPr/>
-          </a:p>
-        </p:txBody>
-      </p:sp>
-      <p:sp>
-        <p:nvSpPr>
-          <p:cNvPr id="11" name="Google Shape;11;p9"/>
-          <p:cNvSpPr txBox="1"/>
-          <p:nvPr/>
-        </p:nvSpPr>
-        <p:spPr>
-          <a:xfrm>
-            <a:off x="5627688" y="6751320"/>
-            <a:ext cx="957262" cy="106680"/>
-          </a:xfrm>
-          <a:prstGeom prst="rect">
-            <a:avLst/>
-          </a:prstGeom>
-          <a:noFill/>
-          <a:ln>
-            <a:noFill/>
-          </a:ln>
-        </p:spPr>
-        <p:txBody>
-          <a:bodyPr spcFirstLastPara="1" wrap="square" lIns="0" tIns="0" rIns="0" bIns="0" anchor="t" anchorCtr="0">
-            <a:spAutoFit/>
-          </a:bodyPr>
-          <a:lstStyle/>
-          <a:p>
-            <a:pPr marL="0" marR="0" lvl="0" indent="0" algn="l" rtl="0">
-              <a:spcBef>
-                <a:spcPts val="0"/>
-              </a:spcBef>
-              <a:spcAft>
-                <a:spcPts val="0"/>
-              </a:spcAft>
-              <a:buNone/>
-            </a:pPr>
-            <a:r>
-              <a:rPr lang="en-US" sz="700" b="0" i="0" u="none" strike="noStrike" cap="none">
-                <a:solidFill>
-                  <a:srgbClr val="000000"/>
-                </a:solidFill>
-                <a:latin typeface="Calibri"/>
-                <a:ea typeface="Calibri"/>
-                <a:cs typeface="Calibri"/>
-                <a:sym typeface="Calibri"/>
-              </a:rPr>
-              <a:t>Juniper Business Use Only</a:t>
-            </a:r>
             <a:endParaRPr/>
           </a:p>
         </p:txBody>
@@ -12632,8 +12653,8 @@
         </p:nvSpPr>
         <p:spPr>
           <a:xfrm>
-            <a:off x="3629891" y="1237673"/>
-            <a:ext cx="4865179" cy="279542"/>
+            <a:off x="3089468" y="1121356"/>
+            <a:ext cx="6034447" cy="563451"/>
           </a:xfrm>
           <a:prstGeom prst="rect">
             <a:avLst/>
@@ -14151,8 +14172,8 @@
         </p:nvSpPr>
         <p:spPr>
           <a:xfrm>
-            <a:off x="3620654" y="1225985"/>
-            <a:ext cx="4950690" cy="279542"/>
+            <a:off x="3594523" y="1117600"/>
+            <a:ext cx="5002954" cy="494146"/>
           </a:xfrm>
           <a:prstGeom prst="rect">
             <a:avLst/>
@@ -15235,8 +15256,8 @@
         </p:nvSpPr>
         <p:spPr>
           <a:xfrm>
-            <a:off x="3629892" y="1200729"/>
-            <a:ext cx="4950690" cy="279542"/>
+            <a:off x="3500693" y="1117600"/>
+            <a:ext cx="5190611" cy="489838"/>
           </a:xfrm>
           <a:prstGeom prst="rect">
             <a:avLst/>
@@ -15782,6 +15803,1962 @@
         </p:txBody>
       </p:sp>
     </p:spTree>
+  </p:cSld>
+  <p:clrMapOvr>
+    <a:masterClrMapping/>
+  </p:clrMapOvr>
+</p:sld>
+</file>
+
+<file path=ppt/slides/slide15.xml><?xml version="1.0" encoding="utf-8"?>
+<p:sld xmlns:a="http://schemas.openxmlformats.org/drawingml/2006/main" xmlns:r="http://schemas.openxmlformats.org/officeDocument/2006/relationships" xmlns:p="http://schemas.openxmlformats.org/presentationml/2006/main">
+  <p:cSld>
+    <p:spTree>
+      <p:nvGrpSpPr>
+        <p:cNvPr id="1" name=""/>
+        <p:cNvGrpSpPr/>
+        <p:nvPr/>
+      </p:nvGrpSpPr>
+      <p:grpSpPr>
+        <a:xfrm>
+          <a:off x="0" y="0"/>
+          <a:ext cx="0" cy="0"/>
+          <a:chOff x="0" y="0"/>
+          <a:chExt cx="0" cy="0"/>
+        </a:xfrm>
+      </p:grpSpPr>
+      <p:cxnSp>
+        <p:nvCxnSpPr>
+          <p:cNvPr id="5" name="Straight Connector 4">
+            <a:extLst>
+              <a:ext uri="{FF2B5EF4-FFF2-40B4-BE49-F238E27FC236}">
+                <a16:creationId xmlns:a16="http://schemas.microsoft.com/office/drawing/2014/main" id="{8D20FC11-58E3-DAD6-8130-EFF4E775FC9C}"/>
+              </a:ext>
+            </a:extLst>
+          </p:cNvPr>
+          <p:cNvCxnSpPr/>
+          <p:nvPr/>
+        </p:nvCxnSpPr>
+        <p:spPr>
+          <a:xfrm>
+            <a:off x="475488" y="3535680"/>
+            <a:ext cx="11045952" cy="0"/>
+          </a:xfrm>
+          <a:prstGeom prst="line">
+            <a:avLst/>
+          </a:prstGeom>
+        </p:spPr>
+        <p:style>
+          <a:lnRef idx="1">
+            <a:schemeClr val="accent1"/>
+          </a:lnRef>
+          <a:fillRef idx="0">
+            <a:schemeClr val="accent1"/>
+          </a:fillRef>
+          <a:effectRef idx="0">
+            <a:schemeClr val="accent1"/>
+          </a:effectRef>
+          <a:fontRef idx="minor">
+            <a:schemeClr val="tx1"/>
+          </a:fontRef>
+        </p:style>
+      </p:cxnSp>
+      <p:cxnSp>
+        <p:nvCxnSpPr>
+          <p:cNvPr id="6" name="Straight Connector 5">
+            <a:extLst>
+              <a:ext uri="{FF2B5EF4-FFF2-40B4-BE49-F238E27FC236}">
+                <a16:creationId xmlns:a16="http://schemas.microsoft.com/office/drawing/2014/main" id="{9E12D0C2-AA98-F8C2-1945-0825482B948C}"/>
+              </a:ext>
+            </a:extLst>
+          </p:cNvPr>
+          <p:cNvCxnSpPr>
+            <a:cxnSpLocks/>
+          </p:cNvCxnSpPr>
+          <p:nvPr/>
+        </p:nvCxnSpPr>
+        <p:spPr>
+          <a:xfrm>
+            <a:off x="4023360" y="463296"/>
+            <a:ext cx="0" cy="5986272"/>
+          </a:xfrm>
+          <a:prstGeom prst="line">
+            <a:avLst/>
+          </a:prstGeom>
+        </p:spPr>
+        <p:style>
+          <a:lnRef idx="1">
+            <a:schemeClr val="accent1"/>
+          </a:lnRef>
+          <a:fillRef idx="0">
+            <a:schemeClr val="accent1"/>
+          </a:fillRef>
+          <a:effectRef idx="0">
+            <a:schemeClr val="accent1"/>
+          </a:effectRef>
+          <a:fontRef idx="minor">
+            <a:schemeClr val="tx1"/>
+          </a:fontRef>
+        </p:style>
+      </p:cxnSp>
+      <p:cxnSp>
+        <p:nvCxnSpPr>
+          <p:cNvPr id="10" name="Straight Connector 9">
+            <a:extLst>
+              <a:ext uri="{FF2B5EF4-FFF2-40B4-BE49-F238E27FC236}">
+                <a16:creationId xmlns:a16="http://schemas.microsoft.com/office/drawing/2014/main" id="{622E0F55-C4F9-623B-C41E-2AF7E44B91A3}"/>
+              </a:ext>
+            </a:extLst>
+          </p:cNvPr>
+          <p:cNvCxnSpPr>
+            <a:cxnSpLocks/>
+          </p:cNvCxnSpPr>
+          <p:nvPr/>
+        </p:nvCxnSpPr>
+        <p:spPr>
+          <a:xfrm>
+            <a:off x="7748016" y="463296"/>
+            <a:ext cx="0" cy="5986272"/>
+          </a:xfrm>
+          <a:prstGeom prst="line">
+            <a:avLst/>
+          </a:prstGeom>
+        </p:spPr>
+        <p:style>
+          <a:lnRef idx="1">
+            <a:schemeClr val="accent1"/>
+          </a:lnRef>
+          <a:fillRef idx="0">
+            <a:schemeClr val="accent1"/>
+          </a:fillRef>
+          <a:effectRef idx="0">
+            <a:schemeClr val="accent1"/>
+          </a:effectRef>
+          <a:fontRef idx="minor">
+            <a:schemeClr val="tx1"/>
+          </a:fontRef>
+        </p:style>
+      </p:cxnSp>
+      <p:sp>
+        <p:nvSpPr>
+          <p:cNvPr id="15" name="TextBox 14">
+            <a:extLst>
+              <a:ext uri="{FF2B5EF4-FFF2-40B4-BE49-F238E27FC236}">
+                <a16:creationId xmlns:a16="http://schemas.microsoft.com/office/drawing/2014/main" id="{FB0C26F0-8676-3EAD-F0A9-5078644E03E3}"/>
+              </a:ext>
+            </a:extLst>
+          </p:cNvPr>
+          <p:cNvSpPr txBox="1"/>
+          <p:nvPr/>
+        </p:nvSpPr>
+        <p:spPr>
+          <a:xfrm>
+            <a:off x="938784" y="353568"/>
+            <a:ext cx="2109215" cy="307777"/>
+          </a:xfrm>
+          <a:prstGeom prst="rect">
+            <a:avLst/>
+          </a:prstGeom>
+        </p:spPr>
+        <p:style>
+          <a:lnRef idx="2">
+            <a:schemeClr val="dk1"/>
+          </a:lnRef>
+          <a:fillRef idx="1">
+            <a:schemeClr val="lt1"/>
+          </a:fillRef>
+          <a:effectRef idx="0">
+            <a:schemeClr val="dk1"/>
+          </a:effectRef>
+          <a:fontRef idx="minor">
+            <a:schemeClr val="dk1"/>
+          </a:fontRef>
+        </p:style>
+        <p:txBody>
+          <a:bodyPr wrap="square" rtlCol="0">
+            <a:spAutoFit/>
+          </a:bodyPr>
+          <a:lstStyle/>
+          <a:p>
+            <a:pPr algn="ctr"/>
+            <a:r>
+              <a:rPr lang="en-AU"/>
+              <a:t>LANDING PAGE</a:t>
+            </a:r>
+          </a:p>
+        </p:txBody>
+      </p:sp>
+      <p:pic>
+        <p:nvPicPr>
+          <p:cNvPr id="17" name="Picture 16">
+            <a:extLst>
+              <a:ext uri="{FF2B5EF4-FFF2-40B4-BE49-F238E27FC236}">
+                <a16:creationId xmlns:a16="http://schemas.microsoft.com/office/drawing/2014/main" id="{029D4EF9-2072-3279-C1D2-FA3B15D58F0B}"/>
+              </a:ext>
+            </a:extLst>
+          </p:cNvPr>
+          <p:cNvPicPr>
+            <a:picLocks noChangeAspect="1"/>
+          </p:cNvPicPr>
+          <p:nvPr/>
+        </p:nvPicPr>
+        <p:blipFill>
+          <a:blip r:embed="rId2"/>
+          <a:stretch>
+            <a:fillRect/>
+          </a:stretch>
+        </p:blipFill>
+        <p:spPr>
+          <a:xfrm>
+            <a:off x="475488" y="964879"/>
+            <a:ext cx="3062999" cy="1645584"/>
+          </a:xfrm>
+          <a:prstGeom prst="rect">
+            <a:avLst/>
+          </a:prstGeom>
+          <a:ln w="38100" cap="sq">
+            <a:solidFill>
+              <a:srgbClr val="000000"/>
+            </a:solidFill>
+            <a:prstDash val="solid"/>
+            <a:miter lim="800000"/>
+          </a:ln>
+          <a:effectLst>
+            <a:outerShdw blurRad="50800" dist="38100" dir="2700000" algn="tl" rotWithShape="0">
+              <a:srgbClr val="000000">
+                <a:alpha val="43000"/>
+              </a:srgbClr>
+            </a:outerShdw>
+          </a:effectLst>
+        </p:spPr>
+      </p:pic>
+      <p:sp>
+        <p:nvSpPr>
+          <p:cNvPr id="18" name="TextBox 17">
+            <a:extLst>
+              <a:ext uri="{FF2B5EF4-FFF2-40B4-BE49-F238E27FC236}">
+                <a16:creationId xmlns:a16="http://schemas.microsoft.com/office/drawing/2014/main" id="{B4D1BE8F-AAEF-7915-4B6B-7D87787C9E8D}"/>
+              </a:ext>
+            </a:extLst>
+          </p:cNvPr>
+          <p:cNvSpPr txBox="1"/>
+          <p:nvPr/>
+        </p:nvSpPr>
+        <p:spPr>
+          <a:xfrm>
+            <a:off x="179756" y="2717768"/>
+            <a:ext cx="3803955" cy="738664"/>
+          </a:xfrm>
+          <a:prstGeom prst="rect">
+            <a:avLst/>
+          </a:prstGeom>
+          <a:noFill/>
+          <a:ln w="9525" cap="flat" cmpd="sng" algn="ctr">
+            <a:solidFill>
+              <a:schemeClr val="accent5"/>
+            </a:solidFill>
+            <a:prstDash val="solid"/>
+            <a:round/>
+            <a:headEnd type="none" w="med" len="med"/>
+            <a:tailEnd type="none" w="med" len="med"/>
+          </a:ln>
+        </p:spPr>
+        <p:style>
+          <a:lnRef idx="0">
+            <a:scrgbClr r="0" g="0" b="0"/>
+          </a:lnRef>
+          <a:fillRef idx="0">
+            <a:scrgbClr r="0" g="0" b="0"/>
+          </a:fillRef>
+          <a:effectRef idx="0">
+            <a:scrgbClr r="0" g="0" b="0"/>
+          </a:effectRef>
+          <a:fontRef idx="minor">
+            <a:schemeClr val="accent5"/>
+          </a:fontRef>
+        </p:style>
+        <p:txBody>
+          <a:bodyPr wrap="square" rtlCol="0">
+            <a:spAutoFit/>
+          </a:bodyPr>
+          <a:lstStyle/>
+          <a:p>
+            <a:pPr algn="ctr"/>
+            <a:r>
+              <a:rPr lang="en-AU"/>
+              <a:t>The landing page is the first page of the system. Consist of a basic Identification and Login &amp; Registration buttons.</a:t>
+            </a:r>
+          </a:p>
+        </p:txBody>
+      </p:sp>
+      <p:sp>
+        <p:nvSpPr>
+          <p:cNvPr id="21" name="TextBox 20">
+            <a:extLst>
+              <a:ext uri="{FF2B5EF4-FFF2-40B4-BE49-F238E27FC236}">
+                <a16:creationId xmlns:a16="http://schemas.microsoft.com/office/drawing/2014/main" id="{9F0F1BA1-9303-D2AA-72BA-B51AC0CB9E49}"/>
+              </a:ext>
+            </a:extLst>
+          </p:cNvPr>
+          <p:cNvSpPr txBox="1"/>
+          <p:nvPr/>
+        </p:nvSpPr>
+        <p:spPr>
+          <a:xfrm>
+            <a:off x="4685021" y="393993"/>
+            <a:ext cx="2109215" cy="307777"/>
+          </a:xfrm>
+          <a:prstGeom prst="rect">
+            <a:avLst/>
+          </a:prstGeom>
+        </p:spPr>
+        <p:style>
+          <a:lnRef idx="2">
+            <a:schemeClr val="dk1"/>
+          </a:lnRef>
+          <a:fillRef idx="1">
+            <a:schemeClr val="lt1"/>
+          </a:fillRef>
+          <a:effectRef idx="0">
+            <a:schemeClr val="dk1"/>
+          </a:effectRef>
+          <a:fontRef idx="minor">
+            <a:schemeClr val="dk1"/>
+          </a:fontRef>
+        </p:style>
+        <p:txBody>
+          <a:bodyPr wrap="square" rtlCol="0">
+            <a:spAutoFit/>
+          </a:bodyPr>
+          <a:lstStyle/>
+          <a:p>
+            <a:pPr algn="ctr"/>
+            <a:r>
+              <a:rPr lang="en-AU"/>
+              <a:t>REGISTRATION PAGE</a:t>
+            </a:r>
+          </a:p>
+        </p:txBody>
+      </p:sp>
+      <p:sp>
+        <p:nvSpPr>
+          <p:cNvPr id="22" name="TextBox 21">
+            <a:extLst>
+              <a:ext uri="{FF2B5EF4-FFF2-40B4-BE49-F238E27FC236}">
+                <a16:creationId xmlns:a16="http://schemas.microsoft.com/office/drawing/2014/main" id="{DBC4C760-910E-6D65-7456-53E82AAEFB35}"/>
+              </a:ext>
+            </a:extLst>
+          </p:cNvPr>
+          <p:cNvSpPr txBox="1"/>
+          <p:nvPr/>
+        </p:nvSpPr>
+        <p:spPr>
+          <a:xfrm>
+            <a:off x="4063010" y="2808320"/>
+            <a:ext cx="3645356" cy="523220"/>
+          </a:xfrm>
+          <a:prstGeom prst="rect">
+            <a:avLst/>
+          </a:prstGeom>
+          <a:noFill/>
+          <a:ln w="9525" cap="flat" cmpd="sng" algn="ctr">
+            <a:solidFill>
+              <a:schemeClr val="accent5"/>
+            </a:solidFill>
+            <a:prstDash val="solid"/>
+            <a:round/>
+            <a:headEnd type="none" w="med" len="med"/>
+            <a:tailEnd type="none" w="med" len="med"/>
+          </a:ln>
+        </p:spPr>
+        <p:style>
+          <a:lnRef idx="0">
+            <a:scrgbClr r="0" g="0" b="0"/>
+          </a:lnRef>
+          <a:fillRef idx="0">
+            <a:scrgbClr r="0" g="0" b="0"/>
+          </a:fillRef>
+          <a:effectRef idx="0">
+            <a:scrgbClr r="0" g="0" b="0"/>
+          </a:effectRef>
+          <a:fontRef idx="minor">
+            <a:schemeClr val="accent5"/>
+          </a:fontRef>
+        </p:style>
+        <p:txBody>
+          <a:bodyPr wrap="square" rtlCol="0">
+            <a:spAutoFit/>
+          </a:bodyPr>
+          <a:lstStyle/>
+          <a:p>
+            <a:pPr algn="ctr"/>
+            <a:r>
+              <a:rPr lang="en-AU"/>
+              <a:t>The Registration page is the page that the applicant uses to register in the system..</a:t>
+            </a:r>
+          </a:p>
+        </p:txBody>
+      </p:sp>
+      <p:pic>
+        <p:nvPicPr>
+          <p:cNvPr id="25" name="Picture 24">
+            <a:extLst>
+              <a:ext uri="{FF2B5EF4-FFF2-40B4-BE49-F238E27FC236}">
+                <a16:creationId xmlns:a16="http://schemas.microsoft.com/office/drawing/2014/main" id="{1459780F-FF58-FF4E-4678-9F98D65C5354}"/>
+              </a:ext>
+            </a:extLst>
+          </p:cNvPr>
+          <p:cNvPicPr>
+            <a:picLocks noChangeAspect="1"/>
+          </p:cNvPicPr>
+          <p:nvPr/>
+        </p:nvPicPr>
+        <p:blipFill>
+          <a:blip r:embed="rId3"/>
+          <a:stretch>
+            <a:fillRect/>
+          </a:stretch>
+        </p:blipFill>
+        <p:spPr>
+          <a:xfrm>
+            <a:off x="8610845" y="964879"/>
+            <a:ext cx="2642371" cy="1686085"/>
+          </a:xfrm>
+          <a:prstGeom prst="rect">
+            <a:avLst/>
+          </a:prstGeom>
+          <a:ln w="38100" cap="sq">
+            <a:solidFill>
+              <a:srgbClr val="000000"/>
+            </a:solidFill>
+            <a:prstDash val="solid"/>
+            <a:miter lim="800000"/>
+          </a:ln>
+          <a:effectLst>
+            <a:outerShdw blurRad="50800" dist="38100" dir="2700000" algn="tl" rotWithShape="0">
+              <a:srgbClr val="000000">
+                <a:alpha val="43000"/>
+              </a:srgbClr>
+            </a:outerShdw>
+          </a:effectLst>
+        </p:spPr>
+      </p:pic>
+      <p:sp>
+        <p:nvSpPr>
+          <p:cNvPr id="26" name="TextBox 25">
+            <a:extLst>
+              <a:ext uri="{FF2B5EF4-FFF2-40B4-BE49-F238E27FC236}">
+                <a16:creationId xmlns:a16="http://schemas.microsoft.com/office/drawing/2014/main" id="{B635A2D0-D207-82D6-040D-99711FC2546D}"/>
+              </a:ext>
+            </a:extLst>
+          </p:cNvPr>
+          <p:cNvSpPr txBox="1"/>
+          <p:nvPr/>
+        </p:nvSpPr>
+        <p:spPr>
+          <a:xfrm>
+            <a:off x="8851881" y="393993"/>
+            <a:ext cx="2109215" cy="307777"/>
+          </a:xfrm>
+          <a:prstGeom prst="rect">
+            <a:avLst/>
+          </a:prstGeom>
+        </p:spPr>
+        <p:style>
+          <a:lnRef idx="2">
+            <a:schemeClr val="dk1"/>
+          </a:lnRef>
+          <a:fillRef idx="1">
+            <a:schemeClr val="lt1"/>
+          </a:fillRef>
+          <a:effectRef idx="0">
+            <a:schemeClr val="dk1"/>
+          </a:effectRef>
+          <a:fontRef idx="minor">
+            <a:schemeClr val="dk1"/>
+          </a:fontRef>
+        </p:style>
+        <p:txBody>
+          <a:bodyPr wrap="square" rtlCol="0">
+            <a:spAutoFit/>
+          </a:bodyPr>
+          <a:lstStyle/>
+          <a:p>
+            <a:pPr algn="ctr"/>
+            <a:r>
+              <a:rPr lang="en-AU"/>
+              <a:t>LOGIN PAGE</a:t>
+            </a:r>
+          </a:p>
+        </p:txBody>
+      </p:sp>
+      <p:sp>
+        <p:nvSpPr>
+          <p:cNvPr id="27" name="TextBox 26">
+            <a:extLst>
+              <a:ext uri="{FF2B5EF4-FFF2-40B4-BE49-F238E27FC236}">
+                <a16:creationId xmlns:a16="http://schemas.microsoft.com/office/drawing/2014/main" id="{EA646A80-7024-38E3-5DC8-5778FFB41D15}"/>
+              </a:ext>
+            </a:extLst>
+          </p:cNvPr>
+          <p:cNvSpPr txBox="1"/>
+          <p:nvPr/>
+        </p:nvSpPr>
+        <p:spPr>
+          <a:xfrm>
+            <a:off x="7783072" y="2808320"/>
+            <a:ext cx="3645356" cy="523220"/>
+          </a:xfrm>
+          <a:prstGeom prst="rect">
+            <a:avLst/>
+          </a:prstGeom>
+          <a:noFill/>
+          <a:ln w="9525" cap="flat" cmpd="sng" algn="ctr">
+            <a:solidFill>
+              <a:schemeClr val="accent5"/>
+            </a:solidFill>
+            <a:prstDash val="solid"/>
+            <a:round/>
+            <a:headEnd type="none" w="med" len="med"/>
+            <a:tailEnd type="none" w="med" len="med"/>
+          </a:ln>
+        </p:spPr>
+        <p:style>
+          <a:lnRef idx="0">
+            <a:scrgbClr r="0" g="0" b="0"/>
+          </a:lnRef>
+          <a:fillRef idx="0">
+            <a:scrgbClr r="0" g="0" b="0"/>
+          </a:fillRef>
+          <a:effectRef idx="0">
+            <a:scrgbClr r="0" g="0" b="0"/>
+          </a:effectRef>
+          <a:fontRef idx="minor">
+            <a:schemeClr val="accent5"/>
+          </a:fontRef>
+        </p:style>
+        <p:txBody>
+          <a:bodyPr wrap="square" rtlCol="0">
+            <a:spAutoFit/>
+          </a:bodyPr>
+          <a:lstStyle/>
+          <a:p>
+            <a:pPr algn="ctr"/>
+            <a:r>
+              <a:rPr lang="en-AU"/>
+              <a:t>The login page is the page that the applicant uses to login in the system..</a:t>
+            </a:r>
+          </a:p>
+        </p:txBody>
+      </p:sp>
+      <p:sp>
+        <p:nvSpPr>
+          <p:cNvPr id="30" name="TextBox 29">
+            <a:extLst>
+              <a:ext uri="{FF2B5EF4-FFF2-40B4-BE49-F238E27FC236}">
+                <a16:creationId xmlns:a16="http://schemas.microsoft.com/office/drawing/2014/main" id="{F439F537-1E01-CFCC-C725-99FDF65FBC54}"/>
+              </a:ext>
+            </a:extLst>
+          </p:cNvPr>
+          <p:cNvSpPr txBox="1"/>
+          <p:nvPr/>
+        </p:nvSpPr>
+        <p:spPr>
+          <a:xfrm>
+            <a:off x="952379" y="3676368"/>
+            <a:ext cx="2109215" cy="307777"/>
+          </a:xfrm>
+          <a:prstGeom prst="rect">
+            <a:avLst/>
+          </a:prstGeom>
+        </p:spPr>
+        <p:style>
+          <a:lnRef idx="2">
+            <a:schemeClr val="dk1"/>
+          </a:lnRef>
+          <a:fillRef idx="1">
+            <a:schemeClr val="lt1"/>
+          </a:fillRef>
+          <a:effectRef idx="0">
+            <a:schemeClr val="dk1"/>
+          </a:effectRef>
+          <a:fontRef idx="minor">
+            <a:schemeClr val="dk1"/>
+          </a:fontRef>
+        </p:style>
+        <p:txBody>
+          <a:bodyPr wrap="square" rtlCol="0">
+            <a:spAutoFit/>
+          </a:bodyPr>
+          <a:lstStyle/>
+          <a:p>
+            <a:pPr algn="ctr"/>
+            <a:r>
+              <a:rPr lang="en-AU"/>
+              <a:t>HOME PAGE</a:t>
+            </a:r>
+          </a:p>
+        </p:txBody>
+      </p:sp>
+      <p:sp>
+        <p:nvSpPr>
+          <p:cNvPr id="31" name="TextBox 30">
+            <a:extLst>
+              <a:ext uri="{FF2B5EF4-FFF2-40B4-BE49-F238E27FC236}">
+                <a16:creationId xmlns:a16="http://schemas.microsoft.com/office/drawing/2014/main" id="{48B1B4F7-F7DF-DBD6-75B6-DAB11C2AA458}"/>
+              </a:ext>
+            </a:extLst>
+          </p:cNvPr>
+          <p:cNvSpPr txBox="1"/>
+          <p:nvPr/>
+        </p:nvSpPr>
+        <p:spPr>
+          <a:xfrm>
+            <a:off x="179756" y="6080236"/>
+            <a:ext cx="3803955" cy="738664"/>
+          </a:xfrm>
+          <a:prstGeom prst="rect">
+            <a:avLst/>
+          </a:prstGeom>
+          <a:noFill/>
+          <a:ln w="9525" cap="flat" cmpd="sng" algn="ctr">
+            <a:solidFill>
+              <a:schemeClr val="accent5"/>
+            </a:solidFill>
+            <a:prstDash val="solid"/>
+            <a:round/>
+            <a:headEnd type="none" w="med" len="med"/>
+            <a:tailEnd type="none" w="med" len="med"/>
+          </a:ln>
+        </p:spPr>
+        <p:style>
+          <a:lnRef idx="0">
+            <a:scrgbClr r="0" g="0" b="0"/>
+          </a:lnRef>
+          <a:fillRef idx="0">
+            <a:scrgbClr r="0" g="0" b="0"/>
+          </a:fillRef>
+          <a:effectRef idx="0">
+            <a:scrgbClr r="0" g="0" b="0"/>
+          </a:effectRef>
+          <a:fontRef idx="minor">
+            <a:schemeClr val="accent5"/>
+          </a:fontRef>
+        </p:style>
+        <p:txBody>
+          <a:bodyPr wrap="square" rtlCol="0">
+            <a:spAutoFit/>
+          </a:bodyPr>
+          <a:lstStyle/>
+          <a:p>
+            <a:pPr algn="ctr"/>
+            <a:r>
+              <a:rPr lang="en-AU"/>
+              <a:t>The home page is the first page of the system once the user has logged in. Shows the options of booking a trial and view history.</a:t>
+            </a:r>
+          </a:p>
+        </p:txBody>
+      </p:sp>
+      <p:pic>
+        <p:nvPicPr>
+          <p:cNvPr id="33" name="Picture 32">
+            <a:extLst>
+              <a:ext uri="{FF2B5EF4-FFF2-40B4-BE49-F238E27FC236}">
+                <a16:creationId xmlns:a16="http://schemas.microsoft.com/office/drawing/2014/main" id="{BD0E1BAE-501D-74F4-0F87-D8FE165FBCED}"/>
+              </a:ext>
+            </a:extLst>
+          </p:cNvPr>
+          <p:cNvPicPr>
+            <a:picLocks noChangeAspect="1"/>
+          </p:cNvPicPr>
+          <p:nvPr/>
+        </p:nvPicPr>
+        <p:blipFill>
+          <a:blip r:embed="rId4"/>
+          <a:stretch>
+            <a:fillRect/>
+          </a:stretch>
+        </p:blipFill>
+        <p:spPr>
+          <a:xfrm>
+            <a:off x="698645" y="4136236"/>
+            <a:ext cx="2766175" cy="1775406"/>
+          </a:xfrm>
+          <a:prstGeom prst="rect">
+            <a:avLst/>
+          </a:prstGeom>
+          <a:ln w="38100" cap="sq">
+            <a:solidFill>
+              <a:srgbClr val="000000"/>
+            </a:solidFill>
+            <a:prstDash val="solid"/>
+            <a:miter lim="800000"/>
+          </a:ln>
+          <a:effectLst>
+            <a:outerShdw blurRad="50800" dist="38100" dir="2700000" algn="tl" rotWithShape="0">
+              <a:srgbClr val="000000">
+                <a:alpha val="43000"/>
+              </a:srgbClr>
+            </a:outerShdw>
+          </a:effectLst>
+        </p:spPr>
+      </p:pic>
+      <p:pic>
+        <p:nvPicPr>
+          <p:cNvPr id="35" name="Picture 34">
+            <a:extLst>
+              <a:ext uri="{FF2B5EF4-FFF2-40B4-BE49-F238E27FC236}">
+                <a16:creationId xmlns:a16="http://schemas.microsoft.com/office/drawing/2014/main" id="{8BF0AA7E-90E8-B886-6D6A-0BC629A62CF8}"/>
+              </a:ext>
+            </a:extLst>
+          </p:cNvPr>
+          <p:cNvPicPr>
+            <a:picLocks noChangeAspect="1"/>
+          </p:cNvPicPr>
+          <p:nvPr/>
+        </p:nvPicPr>
+        <p:blipFill>
+          <a:blip r:embed="rId5"/>
+          <a:stretch>
+            <a:fillRect/>
+          </a:stretch>
+        </p:blipFill>
+        <p:spPr>
+          <a:xfrm>
+            <a:off x="8598602" y="4113378"/>
+            <a:ext cx="2427065" cy="1798261"/>
+          </a:xfrm>
+          <a:prstGeom prst="rect">
+            <a:avLst/>
+          </a:prstGeom>
+          <a:ln w="38100" cap="sq">
+            <a:solidFill>
+              <a:srgbClr val="000000"/>
+            </a:solidFill>
+            <a:prstDash val="solid"/>
+            <a:miter lim="800000"/>
+          </a:ln>
+          <a:effectLst>
+            <a:outerShdw blurRad="50800" dist="38100" dir="2700000" algn="tl" rotWithShape="0">
+              <a:srgbClr val="000000">
+                <a:alpha val="43000"/>
+              </a:srgbClr>
+            </a:outerShdw>
+          </a:effectLst>
+        </p:spPr>
+      </p:pic>
+      <p:pic>
+        <p:nvPicPr>
+          <p:cNvPr id="37" name="Picture 36">
+            <a:extLst>
+              <a:ext uri="{FF2B5EF4-FFF2-40B4-BE49-F238E27FC236}">
+                <a16:creationId xmlns:a16="http://schemas.microsoft.com/office/drawing/2014/main" id="{D6592BE4-CC1A-B47C-BABF-400B054C93EF}"/>
+              </a:ext>
+            </a:extLst>
+          </p:cNvPr>
+          <p:cNvPicPr>
+            <a:picLocks noChangeAspect="1"/>
+          </p:cNvPicPr>
+          <p:nvPr/>
+        </p:nvPicPr>
+        <p:blipFill>
+          <a:blip r:embed="rId6"/>
+          <a:stretch>
+            <a:fillRect/>
+          </a:stretch>
+        </p:blipFill>
+        <p:spPr>
+          <a:xfrm>
+            <a:off x="4678132" y="4138926"/>
+            <a:ext cx="2511343" cy="1772713"/>
+          </a:xfrm>
+          <a:prstGeom prst="rect">
+            <a:avLst/>
+          </a:prstGeom>
+          <a:ln w="38100" cap="sq">
+            <a:solidFill>
+              <a:srgbClr val="000000"/>
+            </a:solidFill>
+            <a:prstDash val="solid"/>
+            <a:miter lim="800000"/>
+          </a:ln>
+          <a:effectLst>
+            <a:outerShdw blurRad="50800" dist="38100" dir="2700000" algn="tl" rotWithShape="0">
+              <a:srgbClr val="000000">
+                <a:alpha val="43000"/>
+              </a:srgbClr>
+            </a:outerShdw>
+          </a:effectLst>
+        </p:spPr>
+      </p:pic>
+      <p:sp>
+        <p:nvSpPr>
+          <p:cNvPr id="38" name="TextBox 37">
+            <a:extLst>
+              <a:ext uri="{FF2B5EF4-FFF2-40B4-BE49-F238E27FC236}">
+                <a16:creationId xmlns:a16="http://schemas.microsoft.com/office/drawing/2014/main" id="{C06A4EC6-B156-5F46-37BA-809935939A9D}"/>
+              </a:ext>
+            </a:extLst>
+          </p:cNvPr>
+          <p:cNvSpPr txBox="1"/>
+          <p:nvPr/>
+        </p:nvSpPr>
+        <p:spPr>
+          <a:xfrm>
+            <a:off x="4866694" y="3683416"/>
+            <a:ext cx="2109215" cy="307777"/>
+          </a:xfrm>
+          <a:prstGeom prst="rect">
+            <a:avLst/>
+          </a:prstGeom>
+        </p:spPr>
+        <p:style>
+          <a:lnRef idx="2">
+            <a:schemeClr val="dk1"/>
+          </a:lnRef>
+          <a:fillRef idx="1">
+            <a:schemeClr val="lt1"/>
+          </a:fillRef>
+          <a:effectRef idx="0">
+            <a:schemeClr val="dk1"/>
+          </a:effectRef>
+          <a:fontRef idx="minor">
+            <a:schemeClr val="dk1"/>
+          </a:fontRef>
+        </p:style>
+        <p:txBody>
+          <a:bodyPr wrap="square" rtlCol="0">
+            <a:spAutoFit/>
+          </a:bodyPr>
+          <a:lstStyle/>
+          <a:p>
+            <a:pPr algn="ctr"/>
+            <a:r>
+              <a:rPr lang="en-AU"/>
+              <a:t>BOOKING PAGE</a:t>
+            </a:r>
+          </a:p>
+        </p:txBody>
+      </p:sp>
+      <p:sp>
+        <p:nvSpPr>
+          <p:cNvPr id="39" name="TextBox 38">
+            <a:extLst>
+              <a:ext uri="{FF2B5EF4-FFF2-40B4-BE49-F238E27FC236}">
+                <a16:creationId xmlns:a16="http://schemas.microsoft.com/office/drawing/2014/main" id="{2E3FBC60-C16E-3CA2-8BF0-6348144CBF02}"/>
+              </a:ext>
+            </a:extLst>
+          </p:cNvPr>
+          <p:cNvSpPr txBox="1"/>
+          <p:nvPr/>
+        </p:nvSpPr>
+        <p:spPr>
+          <a:xfrm>
+            <a:off x="8837715" y="3694440"/>
+            <a:ext cx="2109215" cy="307777"/>
+          </a:xfrm>
+          <a:prstGeom prst="rect">
+            <a:avLst/>
+          </a:prstGeom>
+        </p:spPr>
+        <p:style>
+          <a:lnRef idx="2">
+            <a:schemeClr val="dk1"/>
+          </a:lnRef>
+          <a:fillRef idx="1">
+            <a:schemeClr val="lt1"/>
+          </a:fillRef>
+          <a:effectRef idx="0">
+            <a:schemeClr val="dk1"/>
+          </a:effectRef>
+          <a:fontRef idx="minor">
+            <a:schemeClr val="dk1"/>
+          </a:fontRef>
+        </p:style>
+        <p:txBody>
+          <a:bodyPr wrap="square" rtlCol="0">
+            <a:spAutoFit/>
+          </a:bodyPr>
+          <a:lstStyle/>
+          <a:p>
+            <a:pPr algn="ctr"/>
+            <a:r>
+              <a:rPr lang="en-AU"/>
+              <a:t>VIEW RESULTS PAGE</a:t>
+            </a:r>
+          </a:p>
+        </p:txBody>
+      </p:sp>
+      <p:sp>
+        <p:nvSpPr>
+          <p:cNvPr id="40" name="TextBox 39">
+            <a:extLst>
+              <a:ext uri="{FF2B5EF4-FFF2-40B4-BE49-F238E27FC236}">
+                <a16:creationId xmlns:a16="http://schemas.microsoft.com/office/drawing/2014/main" id="{88AAB467-FE7A-C824-D123-C0D93819D012}"/>
+              </a:ext>
+            </a:extLst>
+          </p:cNvPr>
+          <p:cNvSpPr txBox="1"/>
+          <p:nvPr/>
+        </p:nvSpPr>
+        <p:spPr>
+          <a:xfrm>
+            <a:off x="4076633" y="6118364"/>
+            <a:ext cx="3631734" cy="523220"/>
+          </a:xfrm>
+          <a:prstGeom prst="rect">
+            <a:avLst/>
+          </a:prstGeom>
+          <a:noFill/>
+          <a:ln w="9525" cap="flat" cmpd="sng" algn="ctr">
+            <a:solidFill>
+              <a:schemeClr val="accent5"/>
+            </a:solidFill>
+            <a:prstDash val="solid"/>
+            <a:round/>
+            <a:headEnd type="none" w="med" len="med"/>
+            <a:tailEnd type="none" w="med" len="med"/>
+          </a:ln>
+        </p:spPr>
+        <p:style>
+          <a:lnRef idx="0">
+            <a:scrgbClr r="0" g="0" b="0"/>
+          </a:lnRef>
+          <a:fillRef idx="0">
+            <a:scrgbClr r="0" g="0" b="0"/>
+          </a:fillRef>
+          <a:effectRef idx="0">
+            <a:scrgbClr r="0" g="0" b="0"/>
+          </a:effectRef>
+          <a:fontRef idx="minor">
+            <a:schemeClr val="accent5"/>
+          </a:fontRef>
+        </p:style>
+        <p:txBody>
+          <a:bodyPr wrap="square" rtlCol="0">
+            <a:spAutoFit/>
+          </a:bodyPr>
+          <a:lstStyle/>
+          <a:p>
+            <a:pPr algn="ctr"/>
+            <a:r>
+              <a:rPr lang="en-AU"/>
+              <a:t>The booking page is the page where the user is going to book an appointment.</a:t>
+            </a:r>
+          </a:p>
+        </p:txBody>
+      </p:sp>
+      <p:sp>
+        <p:nvSpPr>
+          <p:cNvPr id="41" name="TextBox 40">
+            <a:extLst>
+              <a:ext uri="{FF2B5EF4-FFF2-40B4-BE49-F238E27FC236}">
+                <a16:creationId xmlns:a16="http://schemas.microsoft.com/office/drawing/2014/main" id="{D98442C2-739F-860E-A934-D55184BC1A4C}"/>
+              </a:ext>
+            </a:extLst>
+          </p:cNvPr>
+          <p:cNvSpPr txBox="1"/>
+          <p:nvPr/>
+        </p:nvSpPr>
+        <p:spPr>
+          <a:xfrm>
+            <a:off x="7818861" y="6106315"/>
+            <a:ext cx="3631734" cy="523220"/>
+          </a:xfrm>
+          <a:prstGeom prst="rect">
+            <a:avLst/>
+          </a:prstGeom>
+          <a:noFill/>
+          <a:ln w="9525" cap="flat" cmpd="sng" algn="ctr">
+            <a:solidFill>
+              <a:schemeClr val="accent5"/>
+            </a:solidFill>
+            <a:prstDash val="solid"/>
+            <a:round/>
+            <a:headEnd type="none" w="med" len="med"/>
+            <a:tailEnd type="none" w="med" len="med"/>
+          </a:ln>
+        </p:spPr>
+        <p:style>
+          <a:lnRef idx="0">
+            <a:scrgbClr r="0" g="0" b="0"/>
+          </a:lnRef>
+          <a:fillRef idx="0">
+            <a:scrgbClr r="0" g="0" b="0"/>
+          </a:fillRef>
+          <a:effectRef idx="0">
+            <a:scrgbClr r="0" g="0" b="0"/>
+          </a:effectRef>
+          <a:fontRef idx="minor">
+            <a:schemeClr val="accent5"/>
+          </a:fontRef>
+        </p:style>
+        <p:txBody>
+          <a:bodyPr wrap="square" rtlCol="0">
+            <a:spAutoFit/>
+          </a:bodyPr>
+          <a:lstStyle/>
+          <a:p>
+            <a:pPr algn="ctr"/>
+            <a:r>
+              <a:rPr lang="en-AU"/>
+              <a:t>The Results page is the page where the user is going to review the result of a trial</a:t>
+            </a:r>
+          </a:p>
+        </p:txBody>
+      </p:sp>
+      <p:pic>
+        <p:nvPicPr>
+          <p:cNvPr id="3" name="Picture 2">
+            <a:extLst>
+              <a:ext uri="{FF2B5EF4-FFF2-40B4-BE49-F238E27FC236}">
+                <a16:creationId xmlns:a16="http://schemas.microsoft.com/office/drawing/2014/main" id="{7A856FBF-4E2F-65C6-4229-EEA40384F2D5}"/>
+              </a:ext>
+            </a:extLst>
+          </p:cNvPr>
+          <p:cNvPicPr>
+            <a:picLocks noChangeAspect="1"/>
+          </p:cNvPicPr>
+          <p:nvPr/>
+        </p:nvPicPr>
+        <p:blipFill>
+          <a:blip r:embed="rId7"/>
+          <a:stretch>
+            <a:fillRect/>
+          </a:stretch>
+        </p:blipFill>
+        <p:spPr>
+          <a:xfrm>
+            <a:off x="4685021" y="817450"/>
+            <a:ext cx="2109214" cy="1900318"/>
+          </a:xfrm>
+          <a:prstGeom prst="rect">
+            <a:avLst/>
+          </a:prstGeom>
+          <a:ln w="38100" cap="sq">
+            <a:solidFill>
+              <a:srgbClr val="000000"/>
+            </a:solidFill>
+            <a:prstDash val="solid"/>
+            <a:miter lim="800000"/>
+          </a:ln>
+          <a:effectLst>
+            <a:outerShdw blurRad="50800" dist="38100" dir="2700000" algn="tl" rotWithShape="0">
+              <a:srgbClr val="000000">
+                <a:alpha val="43000"/>
+              </a:srgbClr>
+            </a:outerShdw>
+          </a:effectLst>
+        </p:spPr>
+      </p:pic>
+    </p:spTree>
+    <p:extLst>
+      <p:ext uri="{BB962C8B-B14F-4D97-AF65-F5344CB8AC3E}">
+        <p14:creationId xmlns:p14="http://schemas.microsoft.com/office/powerpoint/2010/main" val="3349289488"/>
+      </p:ext>
+    </p:extLst>
+  </p:cSld>
+  <p:clrMapOvr>
+    <a:masterClrMapping/>
+  </p:clrMapOvr>
+</p:sld>
+</file>
+
+<file path=ppt/slides/slide16.xml><?xml version="1.0" encoding="utf-8"?>
+<p:sld xmlns:a="http://schemas.openxmlformats.org/drawingml/2006/main" xmlns:r="http://schemas.openxmlformats.org/officeDocument/2006/relationships" xmlns:p="http://schemas.openxmlformats.org/presentationml/2006/main">
+  <p:cSld>
+    <p:spTree>
+      <p:nvGrpSpPr>
+        <p:cNvPr id="1" name=""/>
+        <p:cNvGrpSpPr/>
+        <p:nvPr/>
+      </p:nvGrpSpPr>
+      <p:grpSpPr>
+        <a:xfrm>
+          <a:off x="0" y="0"/>
+          <a:ext cx="0" cy="0"/>
+          <a:chOff x="0" y="0"/>
+          <a:chExt cx="0" cy="0"/>
+        </a:xfrm>
+      </p:grpSpPr>
+      <p:cxnSp>
+        <p:nvCxnSpPr>
+          <p:cNvPr id="5" name="Straight Connector 4">
+            <a:extLst>
+              <a:ext uri="{FF2B5EF4-FFF2-40B4-BE49-F238E27FC236}">
+                <a16:creationId xmlns:a16="http://schemas.microsoft.com/office/drawing/2014/main" id="{8D20FC11-58E3-DAD6-8130-EFF4E775FC9C}"/>
+              </a:ext>
+            </a:extLst>
+          </p:cNvPr>
+          <p:cNvCxnSpPr/>
+          <p:nvPr/>
+        </p:nvCxnSpPr>
+        <p:spPr>
+          <a:xfrm>
+            <a:off x="475488" y="3535680"/>
+            <a:ext cx="11045952" cy="0"/>
+          </a:xfrm>
+          <a:prstGeom prst="line">
+            <a:avLst/>
+          </a:prstGeom>
+        </p:spPr>
+        <p:style>
+          <a:lnRef idx="1">
+            <a:schemeClr val="accent1"/>
+          </a:lnRef>
+          <a:fillRef idx="0">
+            <a:schemeClr val="accent1"/>
+          </a:fillRef>
+          <a:effectRef idx="0">
+            <a:schemeClr val="accent1"/>
+          </a:effectRef>
+          <a:fontRef idx="minor">
+            <a:schemeClr val="tx1"/>
+          </a:fontRef>
+        </p:style>
+      </p:cxnSp>
+      <p:cxnSp>
+        <p:nvCxnSpPr>
+          <p:cNvPr id="6" name="Straight Connector 5">
+            <a:extLst>
+              <a:ext uri="{FF2B5EF4-FFF2-40B4-BE49-F238E27FC236}">
+                <a16:creationId xmlns:a16="http://schemas.microsoft.com/office/drawing/2014/main" id="{9E12D0C2-AA98-F8C2-1945-0825482B948C}"/>
+              </a:ext>
+            </a:extLst>
+          </p:cNvPr>
+          <p:cNvCxnSpPr>
+            <a:cxnSpLocks/>
+          </p:cNvCxnSpPr>
+          <p:nvPr/>
+        </p:nvCxnSpPr>
+        <p:spPr>
+          <a:xfrm>
+            <a:off x="4023360" y="463296"/>
+            <a:ext cx="0" cy="5986272"/>
+          </a:xfrm>
+          <a:prstGeom prst="line">
+            <a:avLst/>
+          </a:prstGeom>
+        </p:spPr>
+        <p:style>
+          <a:lnRef idx="1">
+            <a:schemeClr val="accent1"/>
+          </a:lnRef>
+          <a:fillRef idx="0">
+            <a:schemeClr val="accent1"/>
+          </a:fillRef>
+          <a:effectRef idx="0">
+            <a:schemeClr val="accent1"/>
+          </a:effectRef>
+          <a:fontRef idx="minor">
+            <a:schemeClr val="tx1"/>
+          </a:fontRef>
+        </p:style>
+      </p:cxnSp>
+      <p:cxnSp>
+        <p:nvCxnSpPr>
+          <p:cNvPr id="10" name="Straight Connector 9">
+            <a:extLst>
+              <a:ext uri="{FF2B5EF4-FFF2-40B4-BE49-F238E27FC236}">
+                <a16:creationId xmlns:a16="http://schemas.microsoft.com/office/drawing/2014/main" id="{622E0F55-C4F9-623B-C41E-2AF7E44B91A3}"/>
+              </a:ext>
+            </a:extLst>
+          </p:cNvPr>
+          <p:cNvCxnSpPr>
+            <a:cxnSpLocks/>
+          </p:cNvCxnSpPr>
+          <p:nvPr/>
+        </p:nvCxnSpPr>
+        <p:spPr>
+          <a:xfrm>
+            <a:off x="7748016" y="463296"/>
+            <a:ext cx="0" cy="5986272"/>
+          </a:xfrm>
+          <a:prstGeom prst="line">
+            <a:avLst/>
+          </a:prstGeom>
+        </p:spPr>
+        <p:style>
+          <a:lnRef idx="1">
+            <a:schemeClr val="accent1"/>
+          </a:lnRef>
+          <a:fillRef idx="0">
+            <a:schemeClr val="accent1"/>
+          </a:fillRef>
+          <a:effectRef idx="0">
+            <a:schemeClr val="accent1"/>
+          </a:effectRef>
+          <a:fontRef idx="minor">
+            <a:schemeClr val="tx1"/>
+          </a:fontRef>
+        </p:style>
+      </p:cxnSp>
+      <p:sp>
+        <p:nvSpPr>
+          <p:cNvPr id="15" name="TextBox 14">
+            <a:extLst>
+              <a:ext uri="{FF2B5EF4-FFF2-40B4-BE49-F238E27FC236}">
+                <a16:creationId xmlns:a16="http://schemas.microsoft.com/office/drawing/2014/main" id="{FB0C26F0-8676-3EAD-F0A9-5078644E03E3}"/>
+              </a:ext>
+            </a:extLst>
+          </p:cNvPr>
+          <p:cNvSpPr txBox="1"/>
+          <p:nvPr/>
+        </p:nvSpPr>
+        <p:spPr>
+          <a:xfrm>
+            <a:off x="938784" y="353568"/>
+            <a:ext cx="2109215" cy="307777"/>
+          </a:xfrm>
+          <a:prstGeom prst="rect">
+            <a:avLst/>
+          </a:prstGeom>
+        </p:spPr>
+        <p:style>
+          <a:lnRef idx="2">
+            <a:schemeClr val="dk1"/>
+          </a:lnRef>
+          <a:fillRef idx="1">
+            <a:schemeClr val="lt1"/>
+          </a:fillRef>
+          <a:effectRef idx="0">
+            <a:schemeClr val="dk1"/>
+          </a:effectRef>
+          <a:fontRef idx="minor">
+            <a:schemeClr val="dk1"/>
+          </a:fontRef>
+        </p:style>
+        <p:txBody>
+          <a:bodyPr wrap="square" rtlCol="0">
+            <a:spAutoFit/>
+          </a:bodyPr>
+          <a:lstStyle/>
+          <a:p>
+            <a:pPr algn="ctr"/>
+            <a:r>
+              <a:rPr lang="en-AU"/>
+              <a:t>LANDING PAGE</a:t>
+            </a:r>
+          </a:p>
+        </p:txBody>
+      </p:sp>
+      <p:pic>
+        <p:nvPicPr>
+          <p:cNvPr id="17" name="Picture 16">
+            <a:extLst>
+              <a:ext uri="{FF2B5EF4-FFF2-40B4-BE49-F238E27FC236}">
+                <a16:creationId xmlns:a16="http://schemas.microsoft.com/office/drawing/2014/main" id="{029D4EF9-2072-3279-C1D2-FA3B15D58F0B}"/>
+              </a:ext>
+            </a:extLst>
+          </p:cNvPr>
+          <p:cNvPicPr>
+            <a:picLocks noChangeAspect="1"/>
+          </p:cNvPicPr>
+          <p:nvPr/>
+        </p:nvPicPr>
+        <p:blipFill>
+          <a:blip r:embed="rId3"/>
+          <a:stretch>
+            <a:fillRect/>
+          </a:stretch>
+        </p:blipFill>
+        <p:spPr>
+          <a:xfrm>
+            <a:off x="475488" y="964879"/>
+            <a:ext cx="3062999" cy="1645584"/>
+          </a:xfrm>
+          <a:prstGeom prst="rect">
+            <a:avLst/>
+          </a:prstGeom>
+          <a:ln w="38100" cap="sq">
+            <a:solidFill>
+              <a:srgbClr val="000000"/>
+            </a:solidFill>
+            <a:prstDash val="solid"/>
+            <a:miter lim="800000"/>
+          </a:ln>
+          <a:effectLst>
+            <a:outerShdw blurRad="50800" dist="38100" dir="2700000" algn="tl" rotWithShape="0">
+              <a:srgbClr val="000000">
+                <a:alpha val="43000"/>
+              </a:srgbClr>
+            </a:outerShdw>
+          </a:effectLst>
+        </p:spPr>
+      </p:pic>
+      <p:sp>
+        <p:nvSpPr>
+          <p:cNvPr id="18" name="TextBox 17">
+            <a:extLst>
+              <a:ext uri="{FF2B5EF4-FFF2-40B4-BE49-F238E27FC236}">
+                <a16:creationId xmlns:a16="http://schemas.microsoft.com/office/drawing/2014/main" id="{B4D1BE8F-AAEF-7915-4B6B-7D87787C9E8D}"/>
+              </a:ext>
+            </a:extLst>
+          </p:cNvPr>
+          <p:cNvSpPr txBox="1"/>
+          <p:nvPr/>
+        </p:nvSpPr>
+        <p:spPr>
+          <a:xfrm>
+            <a:off x="179756" y="2717768"/>
+            <a:ext cx="3803955" cy="738664"/>
+          </a:xfrm>
+          <a:prstGeom prst="rect">
+            <a:avLst/>
+          </a:prstGeom>
+          <a:noFill/>
+          <a:ln w="9525" cap="flat" cmpd="sng" algn="ctr">
+            <a:solidFill>
+              <a:schemeClr val="accent5"/>
+            </a:solidFill>
+            <a:prstDash val="solid"/>
+            <a:round/>
+            <a:headEnd type="none" w="med" len="med"/>
+            <a:tailEnd type="none" w="med" len="med"/>
+          </a:ln>
+        </p:spPr>
+        <p:style>
+          <a:lnRef idx="0">
+            <a:scrgbClr r="0" g="0" b="0"/>
+          </a:lnRef>
+          <a:fillRef idx="0">
+            <a:scrgbClr r="0" g="0" b="0"/>
+          </a:fillRef>
+          <a:effectRef idx="0">
+            <a:scrgbClr r="0" g="0" b="0"/>
+          </a:effectRef>
+          <a:fontRef idx="minor">
+            <a:schemeClr val="accent5"/>
+          </a:fontRef>
+        </p:style>
+        <p:txBody>
+          <a:bodyPr wrap="square" rtlCol="0">
+            <a:spAutoFit/>
+          </a:bodyPr>
+          <a:lstStyle/>
+          <a:p>
+            <a:pPr algn="ctr"/>
+            <a:r>
+              <a:rPr lang="en-AU"/>
+              <a:t>The landing page is the first page of the system. Consist of a basic Identification and Login &amp; Registration buttons.</a:t>
+            </a:r>
+          </a:p>
+        </p:txBody>
+      </p:sp>
+      <p:pic>
+        <p:nvPicPr>
+          <p:cNvPr id="25" name="Picture 24">
+            <a:extLst>
+              <a:ext uri="{FF2B5EF4-FFF2-40B4-BE49-F238E27FC236}">
+                <a16:creationId xmlns:a16="http://schemas.microsoft.com/office/drawing/2014/main" id="{1459780F-FF58-FF4E-4678-9F98D65C5354}"/>
+              </a:ext>
+            </a:extLst>
+          </p:cNvPr>
+          <p:cNvPicPr>
+            <a:picLocks noChangeAspect="1"/>
+          </p:cNvPicPr>
+          <p:nvPr/>
+        </p:nvPicPr>
+        <p:blipFill>
+          <a:blip r:embed="rId4"/>
+          <a:stretch>
+            <a:fillRect/>
+          </a:stretch>
+        </p:blipFill>
+        <p:spPr>
+          <a:xfrm>
+            <a:off x="8610845" y="964879"/>
+            <a:ext cx="2642371" cy="1686085"/>
+          </a:xfrm>
+          <a:prstGeom prst="rect">
+            <a:avLst/>
+          </a:prstGeom>
+          <a:ln w="38100" cap="sq">
+            <a:solidFill>
+              <a:srgbClr val="000000"/>
+            </a:solidFill>
+            <a:prstDash val="solid"/>
+            <a:miter lim="800000"/>
+          </a:ln>
+          <a:effectLst>
+            <a:outerShdw blurRad="50800" dist="38100" dir="2700000" algn="tl" rotWithShape="0">
+              <a:srgbClr val="000000">
+                <a:alpha val="43000"/>
+              </a:srgbClr>
+            </a:outerShdw>
+          </a:effectLst>
+        </p:spPr>
+      </p:pic>
+      <p:sp>
+        <p:nvSpPr>
+          <p:cNvPr id="26" name="TextBox 25">
+            <a:extLst>
+              <a:ext uri="{FF2B5EF4-FFF2-40B4-BE49-F238E27FC236}">
+                <a16:creationId xmlns:a16="http://schemas.microsoft.com/office/drawing/2014/main" id="{B635A2D0-D207-82D6-040D-99711FC2546D}"/>
+              </a:ext>
+            </a:extLst>
+          </p:cNvPr>
+          <p:cNvSpPr txBox="1"/>
+          <p:nvPr/>
+        </p:nvSpPr>
+        <p:spPr>
+          <a:xfrm>
+            <a:off x="8851881" y="393993"/>
+            <a:ext cx="2109215" cy="307777"/>
+          </a:xfrm>
+          <a:prstGeom prst="rect">
+            <a:avLst/>
+          </a:prstGeom>
+        </p:spPr>
+        <p:style>
+          <a:lnRef idx="2">
+            <a:schemeClr val="dk1"/>
+          </a:lnRef>
+          <a:fillRef idx="1">
+            <a:schemeClr val="lt1"/>
+          </a:fillRef>
+          <a:effectRef idx="0">
+            <a:schemeClr val="dk1"/>
+          </a:effectRef>
+          <a:fontRef idx="minor">
+            <a:schemeClr val="dk1"/>
+          </a:fontRef>
+        </p:style>
+        <p:txBody>
+          <a:bodyPr wrap="square" rtlCol="0">
+            <a:spAutoFit/>
+          </a:bodyPr>
+          <a:lstStyle/>
+          <a:p>
+            <a:pPr algn="ctr"/>
+            <a:r>
+              <a:rPr lang="en-AU"/>
+              <a:t>LOGIN PAGE</a:t>
+            </a:r>
+          </a:p>
+        </p:txBody>
+      </p:sp>
+      <p:sp>
+        <p:nvSpPr>
+          <p:cNvPr id="27" name="TextBox 26">
+            <a:extLst>
+              <a:ext uri="{FF2B5EF4-FFF2-40B4-BE49-F238E27FC236}">
+                <a16:creationId xmlns:a16="http://schemas.microsoft.com/office/drawing/2014/main" id="{EA646A80-7024-38E3-5DC8-5778FFB41D15}"/>
+              </a:ext>
+            </a:extLst>
+          </p:cNvPr>
+          <p:cNvSpPr txBox="1"/>
+          <p:nvPr/>
+        </p:nvSpPr>
+        <p:spPr>
+          <a:xfrm>
+            <a:off x="7783072" y="2808320"/>
+            <a:ext cx="3645356" cy="523220"/>
+          </a:xfrm>
+          <a:prstGeom prst="rect">
+            <a:avLst/>
+          </a:prstGeom>
+          <a:noFill/>
+          <a:ln w="9525" cap="flat" cmpd="sng" algn="ctr">
+            <a:solidFill>
+              <a:schemeClr val="accent5"/>
+            </a:solidFill>
+            <a:prstDash val="solid"/>
+            <a:round/>
+            <a:headEnd type="none" w="med" len="med"/>
+            <a:tailEnd type="none" w="med" len="med"/>
+          </a:ln>
+        </p:spPr>
+        <p:style>
+          <a:lnRef idx="0">
+            <a:scrgbClr r="0" g="0" b="0"/>
+          </a:lnRef>
+          <a:fillRef idx="0">
+            <a:scrgbClr r="0" g="0" b="0"/>
+          </a:fillRef>
+          <a:effectRef idx="0">
+            <a:scrgbClr r="0" g="0" b="0"/>
+          </a:effectRef>
+          <a:fontRef idx="minor">
+            <a:schemeClr val="accent5"/>
+          </a:fontRef>
+        </p:style>
+        <p:txBody>
+          <a:bodyPr wrap="square" rtlCol="0">
+            <a:spAutoFit/>
+          </a:bodyPr>
+          <a:lstStyle/>
+          <a:p>
+            <a:pPr algn="ctr"/>
+            <a:r>
+              <a:rPr lang="en-AU"/>
+              <a:t>The login page is the page that the staff login in the system..</a:t>
+            </a:r>
+          </a:p>
+        </p:txBody>
+      </p:sp>
+      <p:sp>
+        <p:nvSpPr>
+          <p:cNvPr id="30" name="TextBox 29">
+            <a:extLst>
+              <a:ext uri="{FF2B5EF4-FFF2-40B4-BE49-F238E27FC236}">
+                <a16:creationId xmlns:a16="http://schemas.microsoft.com/office/drawing/2014/main" id="{F439F537-1E01-CFCC-C725-99FDF65FBC54}"/>
+              </a:ext>
+            </a:extLst>
+          </p:cNvPr>
+          <p:cNvSpPr txBox="1"/>
+          <p:nvPr/>
+        </p:nvSpPr>
+        <p:spPr>
+          <a:xfrm>
+            <a:off x="4886368" y="342881"/>
+            <a:ext cx="2109215" cy="307777"/>
+          </a:xfrm>
+          <a:prstGeom prst="rect">
+            <a:avLst/>
+          </a:prstGeom>
+        </p:spPr>
+        <p:style>
+          <a:lnRef idx="2">
+            <a:schemeClr val="dk1"/>
+          </a:lnRef>
+          <a:fillRef idx="1">
+            <a:schemeClr val="lt1"/>
+          </a:fillRef>
+          <a:effectRef idx="0">
+            <a:schemeClr val="dk1"/>
+          </a:effectRef>
+          <a:fontRef idx="minor">
+            <a:schemeClr val="dk1"/>
+          </a:fontRef>
+        </p:style>
+        <p:txBody>
+          <a:bodyPr wrap="square" rtlCol="0">
+            <a:spAutoFit/>
+          </a:bodyPr>
+          <a:lstStyle/>
+          <a:p>
+            <a:pPr algn="ctr"/>
+            <a:r>
+              <a:rPr lang="en-AU"/>
+              <a:t>HOME PAGE</a:t>
+            </a:r>
+          </a:p>
+        </p:txBody>
+      </p:sp>
+      <p:sp>
+        <p:nvSpPr>
+          <p:cNvPr id="31" name="TextBox 30">
+            <a:extLst>
+              <a:ext uri="{FF2B5EF4-FFF2-40B4-BE49-F238E27FC236}">
+                <a16:creationId xmlns:a16="http://schemas.microsoft.com/office/drawing/2014/main" id="{48B1B4F7-F7DF-DBD6-75B6-DAB11C2AA458}"/>
+              </a:ext>
+            </a:extLst>
+          </p:cNvPr>
+          <p:cNvSpPr txBox="1"/>
+          <p:nvPr/>
+        </p:nvSpPr>
+        <p:spPr>
+          <a:xfrm>
+            <a:off x="3944061" y="2740848"/>
+            <a:ext cx="3803955" cy="738664"/>
+          </a:xfrm>
+          <a:prstGeom prst="rect">
+            <a:avLst/>
+          </a:prstGeom>
+          <a:noFill/>
+          <a:ln w="9525" cap="flat" cmpd="sng" algn="ctr">
+            <a:solidFill>
+              <a:schemeClr val="accent5"/>
+            </a:solidFill>
+            <a:prstDash val="solid"/>
+            <a:round/>
+            <a:headEnd type="none" w="med" len="med"/>
+            <a:tailEnd type="none" w="med" len="med"/>
+          </a:ln>
+        </p:spPr>
+        <p:style>
+          <a:lnRef idx="0">
+            <a:scrgbClr r="0" g="0" b="0"/>
+          </a:lnRef>
+          <a:fillRef idx="0">
+            <a:scrgbClr r="0" g="0" b="0"/>
+          </a:fillRef>
+          <a:effectRef idx="0">
+            <a:scrgbClr r="0" g="0" b="0"/>
+          </a:effectRef>
+          <a:fontRef idx="minor">
+            <a:schemeClr val="accent5"/>
+          </a:fontRef>
+        </p:style>
+        <p:txBody>
+          <a:bodyPr wrap="square" rtlCol="0">
+            <a:spAutoFit/>
+          </a:bodyPr>
+          <a:lstStyle/>
+          <a:p>
+            <a:pPr algn="ctr"/>
+            <a:r>
+              <a:rPr lang="en-AU"/>
+              <a:t>The home page is the first page of the system once the staff has logged in. Shows the options of booking review and view history.</a:t>
+            </a:r>
+          </a:p>
+        </p:txBody>
+      </p:sp>
+      <p:sp>
+        <p:nvSpPr>
+          <p:cNvPr id="38" name="TextBox 37">
+            <a:extLst>
+              <a:ext uri="{FF2B5EF4-FFF2-40B4-BE49-F238E27FC236}">
+                <a16:creationId xmlns:a16="http://schemas.microsoft.com/office/drawing/2014/main" id="{C06A4EC6-B156-5F46-37BA-809935939A9D}"/>
+              </a:ext>
+            </a:extLst>
+          </p:cNvPr>
+          <p:cNvSpPr txBox="1"/>
+          <p:nvPr/>
+        </p:nvSpPr>
+        <p:spPr>
+          <a:xfrm>
+            <a:off x="825772" y="3660572"/>
+            <a:ext cx="2362429" cy="307777"/>
+          </a:xfrm>
+          <a:prstGeom prst="rect">
+            <a:avLst/>
+          </a:prstGeom>
+        </p:spPr>
+        <p:style>
+          <a:lnRef idx="2">
+            <a:schemeClr val="dk1"/>
+          </a:lnRef>
+          <a:fillRef idx="1">
+            <a:schemeClr val="lt1"/>
+          </a:fillRef>
+          <a:effectRef idx="0">
+            <a:schemeClr val="dk1"/>
+          </a:effectRef>
+          <a:fontRef idx="minor">
+            <a:schemeClr val="dk1"/>
+          </a:fontRef>
+        </p:style>
+        <p:txBody>
+          <a:bodyPr wrap="square" rtlCol="0">
+            <a:spAutoFit/>
+          </a:bodyPr>
+          <a:lstStyle/>
+          <a:p>
+            <a:pPr algn="ctr"/>
+            <a:r>
+              <a:rPr lang="en-AU"/>
+              <a:t>BOOKING REVIEW PAGE</a:t>
+            </a:r>
+          </a:p>
+        </p:txBody>
+      </p:sp>
+      <p:sp>
+        <p:nvSpPr>
+          <p:cNvPr id="40" name="TextBox 39">
+            <a:extLst>
+              <a:ext uri="{FF2B5EF4-FFF2-40B4-BE49-F238E27FC236}">
+                <a16:creationId xmlns:a16="http://schemas.microsoft.com/office/drawing/2014/main" id="{88AAB467-FE7A-C824-D123-C0D93819D012}"/>
+              </a:ext>
+            </a:extLst>
+          </p:cNvPr>
+          <p:cNvSpPr txBox="1"/>
+          <p:nvPr/>
+        </p:nvSpPr>
+        <p:spPr>
+          <a:xfrm>
+            <a:off x="4076633" y="6118364"/>
+            <a:ext cx="3631734" cy="461665"/>
+          </a:xfrm>
+          <a:prstGeom prst="rect">
+            <a:avLst/>
+          </a:prstGeom>
+          <a:noFill/>
+          <a:ln w="9525" cap="flat" cmpd="sng" algn="ctr">
+            <a:solidFill>
+              <a:schemeClr val="accent5"/>
+            </a:solidFill>
+            <a:prstDash val="solid"/>
+            <a:round/>
+            <a:headEnd type="none" w="med" len="med"/>
+            <a:tailEnd type="none" w="med" len="med"/>
+          </a:ln>
+        </p:spPr>
+        <p:style>
+          <a:lnRef idx="0">
+            <a:scrgbClr r="0" g="0" b="0"/>
+          </a:lnRef>
+          <a:fillRef idx="0">
+            <a:scrgbClr r="0" g="0" b="0"/>
+          </a:fillRef>
+          <a:effectRef idx="0">
+            <a:scrgbClr r="0" g="0" b="0"/>
+          </a:effectRef>
+          <a:fontRef idx="minor">
+            <a:schemeClr val="accent5"/>
+          </a:fontRef>
+        </p:style>
+        <p:txBody>
+          <a:bodyPr wrap="square" rtlCol="0">
+            <a:spAutoFit/>
+          </a:bodyPr>
+          <a:lstStyle/>
+          <a:p>
+            <a:pPr algn="ctr"/>
+            <a:r>
+              <a:rPr lang="en-AU" sz="1200"/>
+              <a:t>The view history page is the page where the staff is going to see appointment history.</a:t>
+            </a:r>
+          </a:p>
+        </p:txBody>
+      </p:sp>
+      <p:pic>
+        <p:nvPicPr>
+          <p:cNvPr id="3" name="Picture 2">
+            <a:extLst>
+              <a:ext uri="{FF2B5EF4-FFF2-40B4-BE49-F238E27FC236}">
+                <a16:creationId xmlns:a16="http://schemas.microsoft.com/office/drawing/2014/main" id="{4E8BACE6-9E2C-29FC-1451-20A8DE62EE31}"/>
+              </a:ext>
+            </a:extLst>
+          </p:cNvPr>
+          <p:cNvPicPr>
+            <a:picLocks noChangeAspect="1"/>
+          </p:cNvPicPr>
+          <p:nvPr/>
+        </p:nvPicPr>
+        <p:blipFill>
+          <a:blip r:embed="rId5"/>
+          <a:stretch>
+            <a:fillRect/>
+          </a:stretch>
+        </p:blipFill>
+        <p:spPr>
+          <a:xfrm>
+            <a:off x="4451468" y="849503"/>
+            <a:ext cx="2693786" cy="1711465"/>
+          </a:xfrm>
+          <a:prstGeom prst="rect">
+            <a:avLst/>
+          </a:prstGeom>
+          <a:ln w="38100" cap="sq">
+            <a:solidFill>
+              <a:srgbClr val="000000"/>
+            </a:solidFill>
+            <a:prstDash val="solid"/>
+            <a:miter lim="800000"/>
+          </a:ln>
+          <a:effectLst>
+            <a:outerShdw blurRad="50800" dist="38100" dir="2700000" algn="tl" rotWithShape="0">
+              <a:srgbClr val="000000">
+                <a:alpha val="43000"/>
+              </a:srgbClr>
+            </a:outerShdw>
+          </a:effectLst>
+        </p:spPr>
+      </p:pic>
+      <p:pic>
+        <p:nvPicPr>
+          <p:cNvPr id="7" name="Picture 6">
+            <a:extLst>
+              <a:ext uri="{FF2B5EF4-FFF2-40B4-BE49-F238E27FC236}">
+                <a16:creationId xmlns:a16="http://schemas.microsoft.com/office/drawing/2014/main" id="{30186ABF-2F0D-5176-0CBE-E25D38C26C7B}"/>
+              </a:ext>
+            </a:extLst>
+          </p:cNvPr>
+          <p:cNvPicPr>
+            <a:picLocks noChangeAspect="1"/>
+          </p:cNvPicPr>
+          <p:nvPr/>
+        </p:nvPicPr>
+        <p:blipFill>
+          <a:blip r:embed="rId6"/>
+          <a:stretch>
+            <a:fillRect/>
+          </a:stretch>
+        </p:blipFill>
+        <p:spPr>
+          <a:xfrm>
+            <a:off x="1282457" y="4069250"/>
+            <a:ext cx="1577483" cy="2037065"/>
+          </a:xfrm>
+          <a:prstGeom prst="rect">
+            <a:avLst/>
+          </a:prstGeom>
+          <a:ln w="38100" cap="sq">
+            <a:solidFill>
+              <a:srgbClr val="000000"/>
+            </a:solidFill>
+            <a:prstDash val="solid"/>
+            <a:miter lim="800000"/>
+          </a:ln>
+          <a:effectLst>
+            <a:outerShdw blurRad="50800" dist="38100" dir="2700000" algn="tl" rotWithShape="0">
+              <a:srgbClr val="000000">
+                <a:alpha val="43000"/>
+              </a:srgbClr>
+            </a:outerShdw>
+          </a:effectLst>
+        </p:spPr>
+      </p:pic>
+      <p:sp>
+        <p:nvSpPr>
+          <p:cNvPr id="8" name="TextBox 7">
+            <a:extLst>
+              <a:ext uri="{FF2B5EF4-FFF2-40B4-BE49-F238E27FC236}">
+                <a16:creationId xmlns:a16="http://schemas.microsoft.com/office/drawing/2014/main" id="{4A534DE0-8AC5-62F1-68CD-521EE937A924}"/>
+              </a:ext>
+            </a:extLst>
+          </p:cNvPr>
+          <p:cNvSpPr txBox="1"/>
+          <p:nvPr/>
+        </p:nvSpPr>
+        <p:spPr>
+          <a:xfrm>
+            <a:off x="4919953" y="3660572"/>
+            <a:ext cx="2109215" cy="307777"/>
+          </a:xfrm>
+          <a:prstGeom prst="rect">
+            <a:avLst/>
+          </a:prstGeom>
+        </p:spPr>
+        <p:style>
+          <a:lnRef idx="2">
+            <a:schemeClr val="dk1"/>
+          </a:lnRef>
+          <a:fillRef idx="1">
+            <a:schemeClr val="lt1"/>
+          </a:fillRef>
+          <a:effectRef idx="0">
+            <a:schemeClr val="dk1"/>
+          </a:effectRef>
+          <a:fontRef idx="minor">
+            <a:schemeClr val="dk1"/>
+          </a:fontRef>
+        </p:style>
+        <p:txBody>
+          <a:bodyPr wrap="square" rtlCol="0">
+            <a:spAutoFit/>
+          </a:bodyPr>
+          <a:lstStyle/>
+          <a:p>
+            <a:pPr algn="ctr"/>
+            <a:r>
+              <a:rPr lang="en-AU"/>
+              <a:t>VIEW HISTORY PAGE</a:t>
+            </a:r>
+          </a:p>
+        </p:txBody>
+      </p:sp>
+      <p:pic>
+        <p:nvPicPr>
+          <p:cNvPr id="11" name="Picture 10">
+            <a:extLst>
+              <a:ext uri="{FF2B5EF4-FFF2-40B4-BE49-F238E27FC236}">
+                <a16:creationId xmlns:a16="http://schemas.microsoft.com/office/drawing/2014/main" id="{1F0EE2CF-149A-2940-7A10-1D2CBE1FF14F}"/>
+              </a:ext>
+            </a:extLst>
+          </p:cNvPr>
+          <p:cNvPicPr>
+            <a:picLocks noChangeAspect="1"/>
+          </p:cNvPicPr>
+          <p:nvPr/>
+        </p:nvPicPr>
+        <p:blipFill>
+          <a:blip r:embed="rId7"/>
+          <a:stretch>
+            <a:fillRect/>
+          </a:stretch>
+        </p:blipFill>
+        <p:spPr>
+          <a:xfrm>
+            <a:off x="5186781" y="4069250"/>
+            <a:ext cx="1643256" cy="1959438"/>
+          </a:xfrm>
+          <a:prstGeom prst="rect">
+            <a:avLst/>
+          </a:prstGeom>
+          <a:ln w="38100" cap="sq">
+            <a:solidFill>
+              <a:srgbClr val="000000"/>
+            </a:solidFill>
+            <a:prstDash val="solid"/>
+            <a:miter lim="800000"/>
+          </a:ln>
+          <a:effectLst>
+            <a:outerShdw blurRad="50800" dist="38100" dir="2700000" algn="tl" rotWithShape="0">
+              <a:srgbClr val="000000">
+                <a:alpha val="43000"/>
+              </a:srgbClr>
+            </a:outerShdw>
+          </a:effectLst>
+        </p:spPr>
+      </p:pic>
+      <p:sp>
+        <p:nvSpPr>
+          <p:cNvPr id="12" name="TextBox 11">
+            <a:extLst>
+              <a:ext uri="{FF2B5EF4-FFF2-40B4-BE49-F238E27FC236}">
+                <a16:creationId xmlns:a16="http://schemas.microsoft.com/office/drawing/2014/main" id="{FDA7F162-8DF9-DF0B-D9DC-0FE52A7AB8C0}"/>
+              </a:ext>
+            </a:extLst>
+          </p:cNvPr>
+          <p:cNvSpPr txBox="1"/>
+          <p:nvPr/>
+        </p:nvSpPr>
+        <p:spPr>
+          <a:xfrm>
+            <a:off x="298705" y="6187958"/>
+            <a:ext cx="3631734" cy="646331"/>
+          </a:xfrm>
+          <a:prstGeom prst="rect">
+            <a:avLst/>
+          </a:prstGeom>
+          <a:noFill/>
+          <a:ln w="9525" cap="flat" cmpd="sng" algn="ctr">
+            <a:solidFill>
+              <a:schemeClr val="accent5"/>
+            </a:solidFill>
+            <a:prstDash val="solid"/>
+            <a:round/>
+            <a:headEnd type="none" w="med" len="med"/>
+            <a:tailEnd type="none" w="med" len="med"/>
+          </a:ln>
+        </p:spPr>
+        <p:style>
+          <a:lnRef idx="0">
+            <a:scrgbClr r="0" g="0" b="0"/>
+          </a:lnRef>
+          <a:fillRef idx="0">
+            <a:scrgbClr r="0" g="0" b="0"/>
+          </a:fillRef>
+          <a:effectRef idx="0">
+            <a:scrgbClr r="0" g="0" b="0"/>
+          </a:effectRef>
+          <a:fontRef idx="minor">
+            <a:schemeClr val="accent5"/>
+          </a:fontRef>
+        </p:style>
+        <p:txBody>
+          <a:bodyPr wrap="square" rtlCol="0">
+            <a:spAutoFit/>
+          </a:bodyPr>
+          <a:lstStyle/>
+          <a:p>
+            <a:pPr algn="ctr"/>
+            <a:r>
+              <a:rPr lang="en-AU" sz="1200"/>
+              <a:t>The booking review page is the page where the staff is going to review and register the trial result of an appointment.</a:t>
+            </a:r>
+          </a:p>
+        </p:txBody>
+      </p:sp>
+    </p:spTree>
+    <p:extLst>
+      <p:ext uri="{BB962C8B-B14F-4D97-AF65-F5344CB8AC3E}">
+        <p14:creationId xmlns:p14="http://schemas.microsoft.com/office/powerpoint/2010/main" val="68720267"/>
+      </p:ext>
+    </p:extLst>
   </p:cSld>
   <p:clrMapOvr>
     <a:masterClrMapping/>
@@ -17996,6 +19973,70 @@
                 <a:sym typeface="Calibri"/>
               </a:rPr>
               <a:t>Sign Up</a:t>
+            </a:r>
+            <a:endParaRPr dirty="0"/>
+          </a:p>
+        </p:txBody>
+      </p:sp>
+      <p:sp>
+        <p:nvSpPr>
+          <p:cNvPr id="13" name="Google Shape;95;p2">
+            <a:extLst>
+              <a:ext uri="{FF2B5EF4-FFF2-40B4-BE49-F238E27FC236}">
+                <a16:creationId xmlns:a16="http://schemas.microsoft.com/office/drawing/2014/main" id="{291DE918-88D4-A78E-9969-664C19118DDB}"/>
+              </a:ext>
+            </a:extLst>
+          </p:cNvPr>
+          <p:cNvSpPr/>
+          <p:nvPr/>
+        </p:nvSpPr>
+        <p:spPr>
+          <a:xfrm>
+            <a:off x="6247573" y="2484516"/>
+            <a:ext cx="2027093" cy="391103"/>
+          </a:xfrm>
+          <a:prstGeom prst="rect">
+            <a:avLst/>
+          </a:prstGeom>
+          <a:solidFill>
+            <a:schemeClr val="lt1"/>
+          </a:solidFill>
+          <a:ln w="12700" cap="flat" cmpd="sng">
+            <a:solidFill>
+              <a:schemeClr val="accent6"/>
+            </a:solidFill>
+            <a:prstDash val="solid"/>
+            <a:miter lim="800000"/>
+            <a:headEnd type="none" w="sm" len="sm"/>
+            <a:tailEnd type="none" w="sm" len="sm"/>
+          </a:ln>
+        </p:spPr>
+        <p:txBody>
+          <a:bodyPr spcFirstLastPara="1" wrap="square" lIns="91425" tIns="45700" rIns="91425" bIns="45700" anchor="ctr" anchorCtr="0">
+            <a:noAutofit/>
+          </a:bodyPr>
+          <a:lstStyle/>
+          <a:p>
+            <a:pPr marL="0" marR="0" lvl="0" indent="0" algn="ctr" rtl="0">
+              <a:spcBef>
+                <a:spcPts val="0"/>
+              </a:spcBef>
+              <a:spcAft>
+                <a:spcPts val="0"/>
+              </a:spcAft>
+              <a:buNone/>
+            </a:pPr>
+            <a:r>
+              <a:rPr lang="en-US" sz="1800" dirty="0">
+                <a:solidFill>
+                  <a:schemeClr val="dk1"/>
+                </a:solidFill>
+                <a:latin typeface="Calibri"/>
+                <a:ea typeface="Calibri"/>
+                <a:cs typeface="Calibri"/>
+                <a:sym typeface="Calibri"/>
+              </a:rPr>
+              <a:t>Email</a:t>
             </a:r>
             <a:endParaRPr dirty="0"/>
           </a:p>
@@ -18217,71 +20258,13 @@
       </p:sp>
       <p:sp>
         <p:nvSpPr>
-          <p:cNvPr id="96" name="Google Shape;96;p2"/>
-          <p:cNvSpPr/>
-          <p:nvPr/>
-        </p:nvSpPr>
-        <p:spPr>
-          <a:xfrm>
-            <a:off x="5082452" y="3233448"/>
-            <a:ext cx="2027093" cy="391103"/>
-          </a:xfrm>
-          <a:prstGeom prst="rect">
-            <a:avLst/>
-          </a:prstGeom>
-          <a:solidFill>
-            <a:schemeClr val="lt1"/>
-          </a:solidFill>
-          <a:ln w="12700" cap="flat" cmpd="sng">
-            <a:solidFill>
-              <a:schemeClr val="accent6"/>
-            </a:solidFill>
-            <a:prstDash val="solid"/>
-            <a:miter lim="800000"/>
-            <a:headEnd type="none" w="sm" len="sm"/>
-            <a:tailEnd type="none" w="sm" len="sm"/>
-          </a:ln>
-        </p:spPr>
-        <p:txBody>
-          <a:bodyPr spcFirstLastPara="1" wrap="square" lIns="91425" tIns="45700" rIns="91425" bIns="45700" anchor="ctr" anchorCtr="0">
-            <a:noAutofit/>
-          </a:bodyPr>
-          <a:lstStyle/>
-          <a:p>
-            <a:pPr marL="0" marR="0" lvl="0" indent="0" algn="ctr" rtl="0">
-              <a:spcBef>
-                <a:spcPts val="0"/>
-              </a:spcBef>
-              <a:spcAft>
-                <a:spcPts val="0"/>
-              </a:spcAft>
-              <a:buNone/>
-            </a:pPr>
-            <a:r>
-              <a:rPr lang="en-US" sz="1800">
-                <a:solidFill>
-                  <a:schemeClr val="dk1"/>
-                </a:solidFill>
-                <a:latin typeface="Calibri"/>
-                <a:ea typeface="Calibri"/>
-                <a:cs typeface="Calibri"/>
-                <a:sym typeface="Calibri"/>
-              </a:rPr>
-              <a:t>Cancel a Trial</a:t>
-            </a:r>
-            <a:endParaRPr/>
-          </a:p>
-        </p:txBody>
-      </p:sp>
-      <p:sp>
-        <p:nvSpPr>
           <p:cNvPr id="97" name="Google Shape;97;p2"/>
           <p:cNvSpPr/>
           <p:nvPr/>
         </p:nvSpPr>
         <p:spPr>
           <a:xfrm>
-            <a:off x="4802958" y="4231287"/>
+            <a:off x="4802958" y="3037800"/>
             <a:ext cx="2856300" cy="391200"/>
           </a:xfrm>
           <a:prstGeom prst="rect">
@@ -18339,7 +20322,7 @@
         </p:nvSpPr>
         <p:spPr>
           <a:xfrm>
-            <a:off x="4667896" y="5229224"/>
+            <a:off x="4667896" y="4035737"/>
             <a:ext cx="2856203" cy="391103"/>
           </a:xfrm>
           <a:prstGeom prst="rect">

</xml_diff>